<commit_message>
Added Peter Lichtner's comments, and revisions for addressing these comments and update the results with mass balance error resolved for LT.
</commit_message>
<xml_diff>
--- a/figs/fig01/fig01conceptualmodel.pptx
+++ b/figs/fig01/fig01conceptualmodel.pptx
@@ -288,7 +288,7 @@
           <a:p>
             <a:fld id="{454DEFEF-247B-3C4B-8BA5-AFB3DB49D2BB}" type="datetimeFigureOut">
               <a:rPr lang="en-US" smtClean="0"/>
-              <a:t>5/10/15</a:t>
+              <a:t>8/10/15</a:t>
             </a:fld>
             <a:endParaRPr lang="en-US"/>
           </a:p>
@@ -458,7 +458,7 @@
           <a:p>
             <a:fld id="{454DEFEF-247B-3C4B-8BA5-AFB3DB49D2BB}" type="datetimeFigureOut">
               <a:rPr lang="en-US" smtClean="0"/>
-              <a:t>5/10/15</a:t>
+              <a:t>8/10/15</a:t>
             </a:fld>
             <a:endParaRPr lang="en-US"/>
           </a:p>
@@ -638,7 +638,7 @@
           <a:p>
             <a:fld id="{454DEFEF-247B-3C4B-8BA5-AFB3DB49D2BB}" type="datetimeFigureOut">
               <a:rPr lang="en-US" smtClean="0"/>
-              <a:t>5/10/15</a:t>
+              <a:t>8/10/15</a:t>
             </a:fld>
             <a:endParaRPr lang="en-US"/>
           </a:p>
@@ -808,7 +808,7 @@
           <a:p>
             <a:fld id="{454DEFEF-247B-3C4B-8BA5-AFB3DB49D2BB}" type="datetimeFigureOut">
               <a:rPr lang="en-US" smtClean="0"/>
-              <a:t>5/10/15</a:t>
+              <a:t>8/10/15</a:t>
             </a:fld>
             <a:endParaRPr lang="en-US"/>
           </a:p>
@@ -1054,7 +1054,7 @@
           <a:p>
             <a:fld id="{454DEFEF-247B-3C4B-8BA5-AFB3DB49D2BB}" type="datetimeFigureOut">
               <a:rPr lang="en-US" smtClean="0"/>
-              <a:t>5/10/15</a:t>
+              <a:t>8/10/15</a:t>
             </a:fld>
             <a:endParaRPr lang="en-US"/>
           </a:p>
@@ -1342,7 +1342,7 @@
           <a:p>
             <a:fld id="{454DEFEF-247B-3C4B-8BA5-AFB3DB49D2BB}" type="datetimeFigureOut">
               <a:rPr lang="en-US" smtClean="0"/>
-              <a:t>5/10/15</a:t>
+              <a:t>8/10/15</a:t>
             </a:fld>
             <a:endParaRPr lang="en-US"/>
           </a:p>
@@ -1769,7 +1769,7 @@
           <a:p>
             <a:fld id="{454DEFEF-247B-3C4B-8BA5-AFB3DB49D2BB}" type="datetimeFigureOut">
               <a:rPr lang="en-US" smtClean="0"/>
-              <a:t>5/10/15</a:t>
+              <a:t>8/10/15</a:t>
             </a:fld>
             <a:endParaRPr lang="en-US"/>
           </a:p>
@@ -1887,7 +1887,7 @@
           <a:p>
             <a:fld id="{454DEFEF-247B-3C4B-8BA5-AFB3DB49D2BB}" type="datetimeFigureOut">
               <a:rPr lang="en-US" smtClean="0"/>
-              <a:t>5/10/15</a:t>
+              <a:t>8/10/15</a:t>
             </a:fld>
             <a:endParaRPr lang="en-US"/>
           </a:p>
@@ -1982,7 +1982,7 @@
           <a:p>
             <a:fld id="{454DEFEF-247B-3C4B-8BA5-AFB3DB49D2BB}" type="datetimeFigureOut">
               <a:rPr lang="en-US" smtClean="0"/>
-              <a:t>5/10/15</a:t>
+              <a:t>8/10/15</a:t>
             </a:fld>
             <a:endParaRPr lang="en-US"/>
           </a:p>
@@ -2259,7 +2259,7 @@
           <a:p>
             <a:fld id="{454DEFEF-247B-3C4B-8BA5-AFB3DB49D2BB}" type="datetimeFigureOut">
               <a:rPr lang="en-US" smtClean="0"/>
-              <a:t>5/10/15</a:t>
+              <a:t>8/10/15</a:t>
             </a:fld>
             <a:endParaRPr lang="en-US"/>
           </a:p>
@@ -2512,7 +2512,7 @@
           <a:p>
             <a:fld id="{454DEFEF-247B-3C4B-8BA5-AFB3DB49D2BB}" type="datetimeFigureOut">
               <a:rPr lang="en-US" smtClean="0"/>
-              <a:t>5/10/15</a:t>
+              <a:t>8/10/15</a:t>
             </a:fld>
             <a:endParaRPr lang="en-US"/>
           </a:p>
@@ -2725,7 +2725,7 @@
           <a:p>
             <a:fld id="{454DEFEF-247B-3C4B-8BA5-AFB3DB49D2BB}" type="datetimeFigureOut">
               <a:rPr lang="en-US" smtClean="0"/>
-              <a:t>5/10/15</a:t>
+              <a:t>8/10/15</a:t>
             </a:fld>
             <a:endParaRPr lang="en-US"/>
           </a:p>
@@ -3697,7 +3697,7 @@
         </p:nvSpPr>
         <p:spPr>
           <a:xfrm>
-            <a:off x="2743200" y="373943"/>
+            <a:off x="1933248" y="373943"/>
             <a:ext cx="1371600" cy="914400"/>
           </a:xfrm>
           <a:prstGeom prst="roundRect">
@@ -3898,7 +3898,7 @@
         </p:nvCxnSpPr>
         <p:spPr>
           <a:xfrm>
-            <a:off x="3432182" y="1297439"/>
+            <a:off x="2622230" y="1297439"/>
             <a:ext cx="0" cy="349248"/>
           </a:xfrm>
           <a:prstGeom prst="straightConnector1">
@@ -4803,7 +4803,7 @@
         </p:nvCxnSpPr>
         <p:spPr>
           <a:xfrm>
-            <a:off x="2378588" y="822253"/>
+            <a:off x="1568636" y="822253"/>
             <a:ext cx="365760" cy="0"/>
           </a:xfrm>
           <a:prstGeom prst="straightConnector1">
@@ -6054,6 +6054,209 @@
           <a:ln>
             <a:solidFill>
               <a:srgbClr val="0000FF"/>
+            </a:solidFill>
+            <a:tailEnd type="arrow"/>
+          </a:ln>
+          <a:effectLst/>
+        </p:spPr>
+        <p:style>
+          <a:lnRef idx="2">
+            <a:schemeClr val="accent1"/>
+          </a:lnRef>
+          <a:fillRef idx="0">
+            <a:schemeClr val="accent1"/>
+          </a:fillRef>
+          <a:effectRef idx="1">
+            <a:schemeClr val="accent1"/>
+          </a:effectRef>
+          <a:fontRef idx="minor">
+            <a:schemeClr val="tx1"/>
+          </a:fontRef>
+        </p:style>
+      </p:cxnSp>
+      <p:sp>
+        <p:nvSpPr>
+          <p:cNvPr id="72" name="Rounded Rectangle 71"/>
+          <p:cNvSpPr/>
+          <p:nvPr/>
+        </p:nvSpPr>
+        <p:spPr>
+          <a:xfrm>
+            <a:off x="3887841" y="374904"/>
+            <a:ext cx="1371600" cy="914400"/>
+          </a:xfrm>
+          <a:prstGeom prst="roundRect">
+            <a:avLst/>
+          </a:prstGeom>
+          <a:noFill/>
+          <a:ln>
+            <a:solidFill>
+              <a:schemeClr val="tx1"/>
+            </a:solidFill>
+          </a:ln>
+          <a:effectLst/>
+        </p:spPr>
+        <p:style>
+          <a:lnRef idx="1">
+            <a:schemeClr val="accent1"/>
+          </a:lnRef>
+          <a:fillRef idx="3">
+            <a:schemeClr val="accent1"/>
+          </a:fillRef>
+          <a:effectRef idx="2">
+            <a:schemeClr val="accent1"/>
+          </a:effectRef>
+          <a:fontRef idx="minor">
+            <a:schemeClr val="lt1"/>
+          </a:fontRef>
+        </p:style>
+        <p:txBody>
+          <a:bodyPr rtlCol="0" anchor="ctr"/>
+          <a:lstStyle/>
+          <a:p>
+            <a:pPr algn="ctr"/>
+            <a:r>
+              <a:rPr lang="en-US" dirty="0" smtClean="0">
+                <a:solidFill>
+                  <a:schemeClr val="tx1"/>
+                </a:solidFill>
+              </a:rPr>
+              <a:t>CWD</a:t>
+            </a:r>
+          </a:p>
+          <a:p>
+            <a:pPr algn="ctr"/>
+            <a:r>
+              <a:rPr lang="en-US" dirty="0" err="1">
+                <a:solidFill>
+                  <a:schemeClr val="tx1"/>
+                </a:solidFill>
+              </a:rPr>
+              <a:t>τ</a:t>
+            </a:r>
+            <a:r>
+              <a:rPr lang="en-US" baseline="-25000" dirty="0">
+                <a:solidFill>
+                  <a:schemeClr val="tx1"/>
+                </a:solidFill>
+              </a:rPr>
+              <a:t> </a:t>
+            </a:r>
+            <a:r>
+              <a:rPr lang="en-US" dirty="0">
+                <a:solidFill>
+                  <a:schemeClr val="tx1"/>
+                </a:solidFill>
+              </a:rPr>
+              <a:t>= </a:t>
+            </a:r>
+            <a:r>
+              <a:rPr lang="en-US" dirty="0" smtClean="0">
+                <a:solidFill>
+                  <a:schemeClr val="tx1"/>
+                </a:solidFill>
+              </a:rPr>
+              <a:t>2.74 y </a:t>
+            </a:r>
+          </a:p>
+        </p:txBody>
+      </p:sp>
+      <p:cxnSp>
+        <p:nvCxnSpPr>
+          <p:cNvPr id="75" name="Straight Arrow Connector 74"/>
+          <p:cNvCxnSpPr/>
+          <p:nvPr/>
+        </p:nvCxnSpPr>
+        <p:spPr>
+          <a:xfrm>
+            <a:off x="4560206" y="1284176"/>
+            <a:ext cx="13435" cy="1274412"/>
+          </a:xfrm>
+          <a:prstGeom prst="straightConnector1">
+            <a:avLst/>
+          </a:prstGeom>
+          <a:ln>
+            <a:solidFill>
+              <a:schemeClr val="tx1"/>
+            </a:solidFill>
+            <a:tailEnd type="arrow"/>
+          </a:ln>
+          <a:effectLst/>
+        </p:spPr>
+        <p:style>
+          <a:lnRef idx="2">
+            <a:schemeClr val="accent1"/>
+          </a:lnRef>
+          <a:fillRef idx="0">
+            <a:schemeClr val="accent1"/>
+          </a:fillRef>
+          <a:effectRef idx="1">
+            <a:schemeClr val="accent1"/>
+          </a:effectRef>
+          <a:fontRef idx="minor">
+            <a:schemeClr val="tx1"/>
+          </a:fontRef>
+        </p:style>
+      </p:cxnSp>
+      <p:cxnSp>
+        <p:nvCxnSpPr>
+          <p:cNvPr id="61" name="Straight Arrow Connector 60"/>
+          <p:cNvCxnSpPr>
+            <a:endCxn id="9" idx="1"/>
+          </p:cNvCxnSpPr>
+          <p:nvPr/>
+        </p:nvCxnSpPr>
+        <p:spPr>
+          <a:xfrm>
+            <a:off x="4122608" y="2558588"/>
+            <a:ext cx="906592" cy="9915"/>
+          </a:xfrm>
+          <a:prstGeom prst="straightConnector1">
+            <a:avLst/>
+          </a:prstGeom>
+          <a:ln>
+            <a:solidFill>
+              <a:schemeClr val="tx1"/>
+            </a:solidFill>
+            <a:headEnd type="arrow"/>
+            <a:tailEnd type="arrow"/>
+          </a:ln>
+        </p:spPr>
+        <p:style>
+          <a:lnRef idx="2">
+            <a:schemeClr val="accent1"/>
+          </a:lnRef>
+          <a:fillRef idx="0">
+            <a:schemeClr val="accent1"/>
+          </a:fillRef>
+          <a:effectRef idx="1">
+            <a:schemeClr val="accent1"/>
+          </a:effectRef>
+          <a:fontRef idx="minor">
+            <a:schemeClr val="tx1"/>
+          </a:fontRef>
+        </p:style>
+      </p:cxnSp>
+      <p:cxnSp>
+        <p:nvCxnSpPr>
+          <p:cNvPr id="80" name="Straight Arrow Connector 79"/>
+          <p:cNvCxnSpPr>
+            <a:stCxn id="11" idx="3"/>
+            <a:endCxn id="72" idx="1"/>
+          </p:cNvCxnSpPr>
+          <p:nvPr/>
+        </p:nvCxnSpPr>
+        <p:spPr>
+          <a:xfrm>
+            <a:off x="3304848" y="831143"/>
+            <a:ext cx="582993" cy="961"/>
+          </a:xfrm>
+          <a:prstGeom prst="straightConnector1">
+            <a:avLst/>
+          </a:prstGeom>
+          <a:ln>
+            <a:solidFill>
+              <a:schemeClr val="tx1"/>
             </a:solidFill>
             <a:tailEnd type="arrow"/>
           </a:ln>

</xml_diff>